<commit_message>
can play with click
</commit_message>
<xml_diff>
--- a/기획.pptx
+++ b/기획.pptx
@@ -11,11 +11,10 @@
     <p:sldId id="257" r:id="rId5"/>
     <p:sldId id="259" r:id="rId6"/>
     <p:sldId id="261" r:id="rId7"/>
-    <p:sldId id="262" r:id="rId8"/>
-    <p:sldId id="263" r:id="rId9"/>
-    <p:sldId id="264" r:id="rId10"/>
-    <p:sldId id="265" r:id="rId11"/>
-    <p:sldId id="266" r:id="rId12"/>
+    <p:sldId id="267" r:id="rId8"/>
+    <p:sldId id="264" r:id="rId9"/>
+    <p:sldId id="265" r:id="rId10"/>
+    <p:sldId id="266" r:id="rId11"/>
   </p:sldIdLst>
   <p:sldSz cx="9144000" cy="6858000" type="screen4x3"/>
   <p:notesSz cx="6858000" cy="9144000"/>
@@ -125,8 +124,7 @@
             <p14:sldId id="257"/>
             <p14:sldId id="259"/>
             <p14:sldId id="261"/>
-            <p14:sldId id="262"/>
-            <p14:sldId id="263"/>
+            <p14:sldId id="267"/>
             <p14:sldId id="264"/>
             <p14:sldId id="265"/>
             <p14:sldId id="266"/>
@@ -272,7 +270,7 @@
           <a:p>
             <a:fld id="{C8A338EC-05DE-4DC0-9870-877347DD5D63}" type="datetimeFigureOut">
               <a:rPr lang="ko-KR" altLang="en-US" smtClean="0"/>
-              <a:t>2025-06-10</a:t>
+              <a:t>2025-06-12</a:t>
             </a:fld>
             <a:endParaRPr lang="ko-KR" altLang="en-US"/>
           </a:p>
@@ -442,7 +440,7 @@
           <a:p>
             <a:fld id="{C8A338EC-05DE-4DC0-9870-877347DD5D63}" type="datetimeFigureOut">
               <a:rPr lang="ko-KR" altLang="en-US" smtClean="0"/>
-              <a:t>2025-06-10</a:t>
+              <a:t>2025-06-12</a:t>
             </a:fld>
             <a:endParaRPr lang="ko-KR" altLang="en-US"/>
           </a:p>
@@ -622,7 +620,7 @@
           <a:p>
             <a:fld id="{C8A338EC-05DE-4DC0-9870-877347DD5D63}" type="datetimeFigureOut">
               <a:rPr lang="ko-KR" altLang="en-US" smtClean="0"/>
-              <a:t>2025-06-10</a:t>
+              <a:t>2025-06-12</a:t>
             </a:fld>
             <a:endParaRPr lang="ko-KR" altLang="en-US"/>
           </a:p>
@@ -792,7 +790,7 @@
           <a:p>
             <a:fld id="{C8A338EC-05DE-4DC0-9870-877347DD5D63}" type="datetimeFigureOut">
               <a:rPr lang="ko-KR" altLang="en-US" smtClean="0"/>
-              <a:t>2025-06-10</a:t>
+              <a:t>2025-06-12</a:t>
             </a:fld>
             <a:endParaRPr lang="ko-KR" altLang="en-US"/>
           </a:p>
@@ -1036,7 +1034,7 @@
           <a:p>
             <a:fld id="{C8A338EC-05DE-4DC0-9870-877347DD5D63}" type="datetimeFigureOut">
               <a:rPr lang="ko-KR" altLang="en-US" smtClean="0"/>
-              <a:t>2025-06-10</a:t>
+              <a:t>2025-06-12</a:t>
             </a:fld>
             <a:endParaRPr lang="ko-KR" altLang="en-US"/>
           </a:p>
@@ -1268,7 +1266,7 @@
           <a:p>
             <a:fld id="{C8A338EC-05DE-4DC0-9870-877347DD5D63}" type="datetimeFigureOut">
               <a:rPr lang="ko-KR" altLang="en-US" smtClean="0"/>
-              <a:t>2025-06-10</a:t>
+              <a:t>2025-06-12</a:t>
             </a:fld>
             <a:endParaRPr lang="ko-KR" altLang="en-US"/>
           </a:p>
@@ -1635,7 +1633,7 @@
           <a:p>
             <a:fld id="{C8A338EC-05DE-4DC0-9870-877347DD5D63}" type="datetimeFigureOut">
               <a:rPr lang="ko-KR" altLang="en-US" smtClean="0"/>
-              <a:t>2025-06-10</a:t>
+              <a:t>2025-06-12</a:t>
             </a:fld>
             <a:endParaRPr lang="ko-KR" altLang="en-US"/>
           </a:p>
@@ -1753,7 +1751,7 @@
           <a:p>
             <a:fld id="{C8A338EC-05DE-4DC0-9870-877347DD5D63}" type="datetimeFigureOut">
               <a:rPr lang="ko-KR" altLang="en-US" smtClean="0"/>
-              <a:t>2025-06-10</a:t>
+              <a:t>2025-06-12</a:t>
             </a:fld>
             <a:endParaRPr lang="ko-KR" altLang="en-US"/>
           </a:p>
@@ -1848,7 +1846,7 @@
           <a:p>
             <a:fld id="{C8A338EC-05DE-4DC0-9870-877347DD5D63}" type="datetimeFigureOut">
               <a:rPr lang="ko-KR" altLang="en-US" smtClean="0"/>
-              <a:t>2025-06-10</a:t>
+              <a:t>2025-06-12</a:t>
             </a:fld>
             <a:endParaRPr lang="ko-KR" altLang="en-US"/>
           </a:p>
@@ -2125,7 +2123,7 @@
           <a:p>
             <a:fld id="{C8A338EC-05DE-4DC0-9870-877347DD5D63}" type="datetimeFigureOut">
               <a:rPr lang="ko-KR" altLang="en-US" smtClean="0"/>
-              <a:t>2025-06-10</a:t>
+              <a:t>2025-06-12</a:t>
             </a:fld>
             <a:endParaRPr lang="ko-KR" altLang="en-US"/>
           </a:p>
@@ -2382,7 +2380,7 @@
           <a:p>
             <a:fld id="{C8A338EC-05DE-4DC0-9870-877347DD5D63}" type="datetimeFigureOut">
               <a:rPr lang="ko-KR" altLang="en-US" smtClean="0"/>
-              <a:t>2025-06-10</a:t>
+              <a:t>2025-06-12</a:t>
             </a:fld>
             <a:endParaRPr lang="ko-KR" altLang="en-US"/>
           </a:p>
@@ -2595,7 +2593,7 @@
           <a:p>
             <a:fld id="{C8A338EC-05DE-4DC0-9870-877347DD5D63}" type="datetimeFigureOut">
               <a:rPr lang="ko-KR" altLang="en-US" smtClean="0"/>
-              <a:t>2025-06-10</a:t>
+              <a:t>2025-06-12</a:t>
             </a:fld>
             <a:endParaRPr lang="ko-KR" altLang="en-US"/>
           </a:p>
@@ -3115,89 +3113,6 @@
           <p:cNvPr id="2" name="제목 1">
             <a:extLst>
               <a:ext uri="{FF2B5EF4-FFF2-40B4-BE49-F238E27FC236}">
-                <a16:creationId xmlns:a16="http://schemas.microsoft.com/office/drawing/2014/main" id="{D360511F-5B9A-BF62-5020-CA9D29CE4C82}"/>
-              </a:ext>
-            </a:extLst>
-          </p:cNvPr>
-          <p:cNvSpPr>
-            <a:spLocks noGrp="1"/>
-          </p:cNvSpPr>
-          <p:nvPr>
-            <p:ph type="title"/>
-          </p:nvPr>
-        </p:nvSpPr>
-        <p:spPr/>
-        <p:txBody>
-          <a:bodyPr/>
-          <a:lstStyle/>
-          <a:p>
-            <a:r>
-              <a:rPr lang="ko-KR" altLang="en-US" dirty="0"/>
-              <a:t>결과 씬</a:t>
-            </a:r>
-          </a:p>
-        </p:txBody>
-      </p:sp>
-      <p:sp>
-        <p:nvSpPr>
-          <p:cNvPr id="3" name="내용 개체 틀 2">
-            <a:extLst>
-              <a:ext uri="{FF2B5EF4-FFF2-40B4-BE49-F238E27FC236}">
-                <a16:creationId xmlns:a16="http://schemas.microsoft.com/office/drawing/2014/main" id="{E4C961DA-C9DB-98B8-167A-65C4E9D77990}"/>
-              </a:ext>
-            </a:extLst>
-          </p:cNvPr>
-          <p:cNvSpPr>
-            <a:spLocks noGrp="1"/>
-          </p:cNvSpPr>
-          <p:nvPr>
-            <p:ph idx="1"/>
-          </p:nvPr>
-        </p:nvSpPr>
-        <p:spPr/>
-        <p:txBody>
-          <a:bodyPr/>
-          <a:lstStyle/>
-          <a:p>
-            <a:endParaRPr lang="ko-KR" altLang="en-US"/>
-          </a:p>
-        </p:txBody>
-      </p:sp>
-    </p:spTree>
-    <p:extLst>
-      <p:ext uri="{BB962C8B-B14F-4D97-AF65-F5344CB8AC3E}">
-        <p14:creationId xmlns:p14="http://schemas.microsoft.com/office/powerpoint/2010/main" val="1128000774"/>
-      </p:ext>
-    </p:extLst>
-  </p:cSld>
-  <p:clrMapOvr>
-    <a:masterClrMapping/>
-  </p:clrMapOvr>
-</p:sld>
-</file>
-
-<file path=ppt/slides/slide11.xml><?xml version="1.0" encoding="utf-8"?>
-<p:sld xmlns:a="http://schemas.openxmlformats.org/drawingml/2006/main" xmlns:r="http://schemas.openxmlformats.org/officeDocument/2006/relationships" xmlns:p="http://schemas.openxmlformats.org/presentationml/2006/main">
-  <p:cSld>
-    <p:spTree>
-      <p:nvGrpSpPr>
-        <p:cNvPr id="1" name=""/>
-        <p:cNvGrpSpPr/>
-        <p:nvPr/>
-      </p:nvGrpSpPr>
-      <p:grpSpPr>
-        <a:xfrm>
-          <a:off x="0" y="0"/>
-          <a:ext cx="0" cy="0"/>
-          <a:chOff x="0" y="0"/>
-          <a:chExt cx="0" cy="0"/>
-        </a:xfrm>
-      </p:grpSpPr>
-      <p:sp>
-        <p:nvSpPr>
-          <p:cNvPr id="2" name="제목 1">
-            <a:extLst>
-              <a:ext uri="{FF2B5EF4-FFF2-40B4-BE49-F238E27FC236}">
                 <a16:creationId xmlns:a16="http://schemas.microsoft.com/office/drawing/2014/main" id="{AFE23860-2F4E-C693-DEC1-2AEA294EB93B}"/>
               </a:ext>
             </a:extLst>
@@ -5020,6 +4935,133 @@
           </a:p>
         </p:txBody>
       </p:sp>
+      <p:sp>
+        <p:nvSpPr>
+          <p:cNvPr id="4" name="직사각형 3">
+            <a:extLst>
+              <a:ext uri="{FF2B5EF4-FFF2-40B4-BE49-F238E27FC236}">
+                <a16:creationId xmlns:a16="http://schemas.microsoft.com/office/drawing/2014/main" id="{4C8BFF79-1622-AB8E-1C10-5B9D00A67C16}"/>
+              </a:ext>
+            </a:extLst>
+          </p:cNvPr>
+          <p:cNvSpPr/>
+          <p:nvPr/>
+        </p:nvSpPr>
+        <p:spPr>
+          <a:xfrm>
+            <a:off x="1802485" y="3782590"/>
+            <a:ext cx="5006176" cy="2647720"/>
+          </a:xfrm>
+          <a:prstGeom prst="rect">
+            <a:avLst/>
+          </a:prstGeom>
+          <a:solidFill>
+            <a:schemeClr val="tx1"/>
+          </a:solidFill>
+        </p:spPr>
+        <p:style>
+          <a:lnRef idx="2">
+            <a:schemeClr val="accent1">
+              <a:shade val="15000"/>
+            </a:schemeClr>
+          </a:lnRef>
+          <a:fillRef idx="1">
+            <a:schemeClr val="accent1"/>
+          </a:fillRef>
+          <a:effectRef idx="0">
+            <a:schemeClr val="accent1"/>
+          </a:effectRef>
+          <a:fontRef idx="minor">
+            <a:schemeClr val="lt1"/>
+          </a:fontRef>
+        </p:style>
+        <p:txBody>
+          <a:bodyPr rtlCol="0" anchor="ctr"/>
+          <a:lstStyle/>
+          <a:p>
+            <a:pPr algn="ctr"/>
+            <a:endParaRPr lang="ko-KR" altLang="en-US"/>
+          </a:p>
+        </p:txBody>
+      </p:sp>
+      <p:sp>
+        <p:nvSpPr>
+          <p:cNvPr id="5" name="TextBox 4">
+            <a:extLst>
+              <a:ext uri="{FF2B5EF4-FFF2-40B4-BE49-F238E27FC236}">
+                <a16:creationId xmlns:a16="http://schemas.microsoft.com/office/drawing/2014/main" id="{8B7A466E-CF65-D053-4CD0-F92A5075C99C}"/>
+              </a:ext>
+            </a:extLst>
+          </p:cNvPr>
+          <p:cNvSpPr txBox="1"/>
+          <p:nvPr/>
+        </p:nvSpPr>
+        <p:spPr>
+          <a:xfrm>
+            <a:off x="3148044" y="4591736"/>
+            <a:ext cx="2315057" cy="369332"/>
+          </a:xfrm>
+          <a:prstGeom prst="rect">
+            <a:avLst/>
+          </a:prstGeom>
+          <a:noFill/>
+        </p:spPr>
+        <p:txBody>
+          <a:bodyPr wrap="none" rtlCol="0">
+            <a:spAutoFit/>
+          </a:bodyPr>
+          <a:lstStyle/>
+          <a:p>
+            <a:r>
+              <a:rPr lang="ko-KR" altLang="en-US">
+                <a:solidFill>
+                  <a:schemeClr val="bg1"/>
+                </a:solidFill>
+              </a:rPr>
+              <a:t>로그인이 필요합니다</a:t>
+            </a:r>
+          </a:p>
+        </p:txBody>
+      </p:sp>
+      <p:sp>
+        <p:nvSpPr>
+          <p:cNvPr id="6" name="TextBox 5">
+            <a:extLst>
+              <a:ext uri="{FF2B5EF4-FFF2-40B4-BE49-F238E27FC236}">
+                <a16:creationId xmlns:a16="http://schemas.microsoft.com/office/drawing/2014/main" id="{C2E996E1-0B76-9EB1-F3AB-F37C158E16CE}"/>
+              </a:ext>
+            </a:extLst>
+          </p:cNvPr>
+          <p:cNvSpPr txBox="1"/>
+          <p:nvPr/>
+        </p:nvSpPr>
+        <p:spPr>
+          <a:xfrm>
+            <a:off x="3609708" y="5106450"/>
+            <a:ext cx="1391728" cy="369332"/>
+          </a:xfrm>
+          <a:prstGeom prst="rect">
+            <a:avLst/>
+          </a:prstGeom>
+          <a:noFill/>
+        </p:spPr>
+        <p:txBody>
+          <a:bodyPr wrap="none" rtlCol="0">
+            <a:spAutoFit/>
+          </a:bodyPr>
+          <a:lstStyle/>
+          <a:p>
+            <a:r>
+              <a:rPr lang="ko-KR" altLang="en-US">
+                <a:solidFill>
+                  <a:schemeClr val="bg1"/>
+                </a:solidFill>
+              </a:rPr>
+              <a:t>로그인 버튼</a:t>
+            </a:r>
+          </a:p>
+        </p:txBody>
+      </p:sp>
     </p:spTree>
     <p:extLst>
       <p:ext uri="{BB962C8B-B14F-4D97-AF65-F5344CB8AC3E}">
@@ -5152,7 +5194,7 @@
           <a:lstStyle/>
           <a:p>
             <a:pPr algn="ctr"/>
-            <a:endParaRPr lang="ko-KR" altLang="en-US"/>
+            <a:endParaRPr lang="ko-KR" altLang="en-US" dirty="0"/>
           </a:p>
         </p:txBody>
       </p:sp>
@@ -5564,6 +5606,69 @@
           <a:p>
             <a:pPr algn="ctr"/>
             <a:endParaRPr lang="ko-KR" altLang="en-US"/>
+          </a:p>
+        </p:txBody>
+      </p:sp>
+      <p:sp>
+        <p:nvSpPr>
+          <p:cNvPr id="10" name="TextBox 9">
+            <a:extLst>
+              <a:ext uri="{FF2B5EF4-FFF2-40B4-BE49-F238E27FC236}">
+                <a16:creationId xmlns:a16="http://schemas.microsoft.com/office/drawing/2014/main" id="{AAFE7F53-D5AE-E0D2-FB75-D2BF01D06939}"/>
+              </a:ext>
+            </a:extLst>
+          </p:cNvPr>
+          <p:cNvSpPr txBox="1"/>
+          <p:nvPr/>
+        </p:nvSpPr>
+        <p:spPr>
+          <a:xfrm>
+            <a:off x="1203134" y="2716886"/>
+            <a:ext cx="2099229" cy="369332"/>
+          </a:xfrm>
+          <a:prstGeom prst="rect">
+            <a:avLst/>
+          </a:prstGeom>
+          <a:noFill/>
+        </p:spPr>
+        <p:txBody>
+          <a:bodyPr wrap="none" rtlCol="0">
+            <a:spAutoFit/>
+          </a:bodyPr>
+          <a:lstStyle/>
+          <a:p>
+            <a:r>
+              <a:rPr lang="ko-KR" altLang="en-US" err="1">
+                <a:solidFill>
+                  <a:schemeClr val="bg1"/>
+                </a:solidFill>
+              </a:rPr>
+              <a:t>스트리머</a:t>
+            </a:r>
+            <a:r>
+              <a:rPr lang="ko-KR" altLang="en-US" dirty="0">
+                <a:solidFill>
+                  <a:schemeClr val="bg1"/>
+                </a:solidFill>
+              </a:rPr>
+              <a:t> </a:t>
+            </a:r>
+            <a:r>
+              <a:rPr lang="en-US" altLang="ko-KR" dirty="0">
+                <a:solidFill>
+                  <a:schemeClr val="bg1"/>
+                </a:solidFill>
+              </a:rPr>
+              <a:t>vs </a:t>
+            </a:r>
+            <a:r>
+              <a:rPr lang="ko-KR" altLang="en-US" dirty="0">
+                <a:solidFill>
+                  <a:schemeClr val="bg1"/>
+                </a:solidFill>
+              </a:rPr>
+              <a:t>시청자</a:t>
+            </a:r>
           </a:p>
         </p:txBody>
       </p:sp>
@@ -5661,6 +5766,195 @@
           </a:p>
         </p:txBody>
       </p:sp>
+      <p:sp>
+        <p:nvSpPr>
+          <p:cNvPr id="4" name="직사각형 3">
+            <a:extLst>
+              <a:ext uri="{FF2B5EF4-FFF2-40B4-BE49-F238E27FC236}">
+                <a16:creationId xmlns:a16="http://schemas.microsoft.com/office/drawing/2014/main" id="{7AF3931B-DB22-6E41-80AB-F014A9D25E25}"/>
+              </a:ext>
+            </a:extLst>
+          </p:cNvPr>
+          <p:cNvSpPr/>
+          <p:nvPr/>
+        </p:nvSpPr>
+        <p:spPr>
+          <a:xfrm>
+            <a:off x="1835377" y="3749698"/>
+            <a:ext cx="5006176" cy="2647720"/>
+          </a:xfrm>
+          <a:prstGeom prst="rect">
+            <a:avLst/>
+          </a:prstGeom>
+          <a:solidFill>
+            <a:schemeClr val="tx1"/>
+          </a:solidFill>
+        </p:spPr>
+        <p:style>
+          <a:lnRef idx="2">
+            <a:schemeClr val="accent1">
+              <a:shade val="15000"/>
+            </a:schemeClr>
+          </a:lnRef>
+          <a:fillRef idx="1">
+            <a:schemeClr val="accent1"/>
+          </a:fillRef>
+          <a:effectRef idx="0">
+            <a:schemeClr val="accent1"/>
+          </a:effectRef>
+          <a:fontRef idx="minor">
+            <a:schemeClr val="lt1"/>
+          </a:fontRef>
+        </p:style>
+        <p:txBody>
+          <a:bodyPr rtlCol="0" anchor="ctr"/>
+          <a:lstStyle/>
+          <a:p>
+            <a:pPr algn="ctr"/>
+            <a:endParaRPr lang="ko-KR" altLang="en-US"/>
+          </a:p>
+        </p:txBody>
+      </p:sp>
+      <p:sp>
+        <p:nvSpPr>
+          <p:cNvPr id="5" name="TextBox 4">
+            <a:extLst>
+              <a:ext uri="{FF2B5EF4-FFF2-40B4-BE49-F238E27FC236}">
+                <a16:creationId xmlns:a16="http://schemas.microsoft.com/office/drawing/2014/main" id="{BA2E37DB-EEAC-99A6-840F-4A378EB535A9}"/>
+              </a:ext>
+            </a:extLst>
+          </p:cNvPr>
+          <p:cNvSpPr txBox="1"/>
+          <p:nvPr/>
+        </p:nvSpPr>
+        <p:spPr>
+          <a:xfrm>
+            <a:off x="1940633" y="3816628"/>
+            <a:ext cx="1160895" cy="369332"/>
+          </a:xfrm>
+          <a:prstGeom prst="rect">
+            <a:avLst/>
+          </a:prstGeom>
+          <a:noFill/>
+        </p:spPr>
+        <p:txBody>
+          <a:bodyPr wrap="none" rtlCol="0">
+            <a:spAutoFit/>
+          </a:bodyPr>
+          <a:lstStyle/>
+          <a:p>
+            <a:r>
+              <a:rPr lang="ko-KR" altLang="en-US" dirty="0">
+                <a:solidFill>
+                  <a:schemeClr val="bg1"/>
+                </a:solidFill>
+              </a:rPr>
+              <a:t>게임 이름</a:t>
+            </a:r>
+          </a:p>
+        </p:txBody>
+      </p:sp>
+      <p:sp>
+        <p:nvSpPr>
+          <p:cNvPr id="6" name="TextBox 5">
+            <a:extLst>
+              <a:ext uri="{FF2B5EF4-FFF2-40B4-BE49-F238E27FC236}">
+                <a16:creationId xmlns:a16="http://schemas.microsoft.com/office/drawing/2014/main" id="{6A5D165C-D683-3325-E627-BE1C97EFE9AF}"/>
+              </a:ext>
+            </a:extLst>
+          </p:cNvPr>
+          <p:cNvSpPr txBox="1"/>
+          <p:nvPr/>
+        </p:nvSpPr>
+        <p:spPr>
+          <a:xfrm>
+            <a:off x="5713160" y="5944654"/>
+            <a:ext cx="1103187" cy="369332"/>
+          </a:xfrm>
+          <a:prstGeom prst="rect">
+            <a:avLst/>
+          </a:prstGeom>
+          <a:noFill/>
+        </p:spPr>
+        <p:txBody>
+          <a:bodyPr wrap="none" rtlCol="0">
+            <a:spAutoFit/>
+          </a:bodyPr>
+          <a:lstStyle/>
+          <a:p>
+            <a:r>
+              <a:rPr lang="ko-KR" altLang="en-US" dirty="0">
+                <a:solidFill>
+                  <a:schemeClr val="bg1"/>
+                </a:solidFill>
+              </a:rPr>
+              <a:t>준비 중</a:t>
+            </a:r>
+            <a:r>
+              <a:rPr lang="en-US" altLang="ko-KR" dirty="0">
+                <a:solidFill>
+                  <a:schemeClr val="bg1"/>
+                </a:solidFill>
+              </a:rPr>
+              <a:t>…</a:t>
+            </a:r>
+            <a:endParaRPr lang="ko-KR" altLang="en-US" dirty="0">
+              <a:solidFill>
+                <a:schemeClr val="bg1"/>
+              </a:solidFill>
+            </a:endParaRPr>
+          </a:p>
+        </p:txBody>
+      </p:sp>
+      <p:sp>
+        <p:nvSpPr>
+          <p:cNvPr id="7" name="직사각형 6">
+            <a:extLst>
+              <a:ext uri="{FF2B5EF4-FFF2-40B4-BE49-F238E27FC236}">
+                <a16:creationId xmlns:a16="http://schemas.microsoft.com/office/drawing/2014/main" id="{0A4A4056-50CD-0F44-2619-E20F7181C06F}"/>
+              </a:ext>
+            </a:extLst>
+          </p:cNvPr>
+          <p:cNvSpPr/>
+          <p:nvPr/>
+        </p:nvSpPr>
+        <p:spPr>
+          <a:xfrm>
+            <a:off x="3268983" y="4567687"/>
+            <a:ext cx="2138964" cy="1146336"/>
+          </a:xfrm>
+          <a:prstGeom prst="rect">
+            <a:avLst/>
+          </a:prstGeom>
+        </p:spPr>
+        <p:style>
+          <a:lnRef idx="2">
+            <a:schemeClr val="accent1">
+              <a:shade val="15000"/>
+            </a:schemeClr>
+          </a:lnRef>
+          <a:fillRef idx="1">
+            <a:schemeClr val="accent1"/>
+          </a:fillRef>
+          <a:effectRef idx="0">
+            <a:schemeClr val="accent1"/>
+          </a:effectRef>
+          <a:fontRef idx="minor">
+            <a:schemeClr val="lt1"/>
+          </a:fontRef>
+        </p:style>
+        <p:txBody>
+          <a:bodyPr rtlCol="0" anchor="ctr"/>
+          <a:lstStyle/>
+          <a:p>
+            <a:pPr algn="ctr"/>
+            <a:r>
+              <a:rPr lang="ko-KR" altLang="en-US"/>
+              <a:t>로딩 애니메이션</a:t>
+            </a:r>
+          </a:p>
+        </p:txBody>
+      </p:sp>
     </p:spTree>
     <p:extLst>
       <p:ext uri="{BB962C8B-B14F-4D97-AF65-F5344CB8AC3E}">
@@ -5679,7 +5973,13 @@
   <p:cSld>
     <p:spTree>
       <p:nvGrpSpPr>
-        <p:cNvPr id="1" name=""/>
+        <p:cNvPr id="1" name="">
+          <a:extLst>
+            <a:ext uri="{FF2B5EF4-FFF2-40B4-BE49-F238E27FC236}">
+              <a16:creationId xmlns:a16="http://schemas.microsoft.com/office/drawing/2014/main" id="{BAD44986-8741-36A6-578D-9BF903CD361D}"/>
+            </a:ext>
+          </a:extLst>
+        </p:cNvPr>
         <p:cNvGrpSpPr/>
         <p:nvPr/>
       </p:nvGrpSpPr>
@@ -5696,7 +5996,7 @@
           <p:cNvPr id="2" name="제목 1">
             <a:extLst>
               <a:ext uri="{FF2B5EF4-FFF2-40B4-BE49-F238E27FC236}">
-                <a16:creationId xmlns:a16="http://schemas.microsoft.com/office/drawing/2014/main" id="{75DCF4DD-F58D-B361-FD3F-CFADE2EE1398}"/>
+                <a16:creationId xmlns:a16="http://schemas.microsoft.com/office/drawing/2014/main" id="{ED7650F0-0EEE-C8A4-9C42-F7EFE5779D92}"/>
               </a:ext>
             </a:extLst>
           </p:cNvPr>
@@ -5714,7 +6014,7 @@
           <a:p>
             <a:r>
               <a:rPr lang="ko-KR" altLang="en-US" dirty="0"/>
-              <a:t>튜토리얼 씬</a:t>
+              <a:t>설정 씬</a:t>
             </a:r>
           </a:p>
         </p:txBody>
@@ -5724,7 +6024,7 @@
           <p:cNvPr id="3" name="내용 개체 틀 2">
             <a:extLst>
               <a:ext uri="{FF2B5EF4-FFF2-40B4-BE49-F238E27FC236}">
-                <a16:creationId xmlns:a16="http://schemas.microsoft.com/office/drawing/2014/main" id="{788DD9AF-C5DC-1105-0543-ACAD99E32807}"/>
+                <a16:creationId xmlns:a16="http://schemas.microsoft.com/office/drawing/2014/main" id="{89818FE6-2EDB-F368-D2C6-8804223B1791}"/>
               </a:ext>
             </a:extLst>
           </p:cNvPr>
@@ -5742,15 +6042,1161 @@
           <a:p>
             <a:r>
               <a:rPr lang="ko-KR" altLang="en-US" dirty="0"/>
-              <a:t>게임 플레이 방법</a:t>
-            </a:r>
+              <a:t>팀 설정</a:t>
+            </a:r>
+            <a:endParaRPr lang="en-US" altLang="ko-KR" dirty="0"/>
+          </a:p>
+          <a:p>
+            <a:pPr lvl="1"/>
+            <a:r>
+              <a:rPr lang="ko-KR" altLang="en-US" dirty="0"/>
+              <a:t>팀 종류</a:t>
+            </a:r>
+            <a:endParaRPr lang="en-US" altLang="ko-KR" dirty="0"/>
+          </a:p>
+          <a:p>
+            <a:pPr lvl="2"/>
+            <a:r>
+              <a:rPr lang="ko-KR" altLang="en-US" dirty="0" err="1"/>
+              <a:t>스트리머</a:t>
+            </a:r>
+            <a:r>
+              <a:rPr lang="en-US" altLang="ko-KR" dirty="0"/>
+              <a:t>, </a:t>
+            </a:r>
+            <a:r>
+              <a:rPr lang="ko-KR" altLang="en-US" dirty="0"/>
+              <a:t>시청자</a:t>
+            </a:r>
+            <a:r>
+              <a:rPr lang="en-US" altLang="ko-KR" dirty="0"/>
+              <a:t>, </a:t>
+            </a:r>
+            <a:r>
+              <a:rPr lang="ko-KR" altLang="en-US" dirty="0" err="1"/>
+              <a:t>스트리머</a:t>
+            </a:r>
+            <a:r>
+              <a:rPr lang="en-US" altLang="ko-KR" dirty="0"/>
+              <a:t>+</a:t>
+            </a:r>
+            <a:r>
+              <a:rPr lang="ko-KR" altLang="en-US" dirty="0"/>
+              <a:t>일부 시청자</a:t>
+            </a:r>
+            <a:r>
+              <a:rPr lang="en-US" altLang="ko-KR" dirty="0"/>
+              <a:t>, </a:t>
+            </a:r>
+            <a:r>
+              <a:rPr lang="ko-KR" altLang="en-US" dirty="0"/>
+              <a:t>일부 시청자 등</a:t>
+            </a:r>
+            <a:endParaRPr lang="en-US" altLang="ko-KR" dirty="0"/>
+          </a:p>
+          <a:p>
+            <a:pPr lvl="1"/>
+            <a:r>
+              <a:rPr lang="ko-KR" altLang="en-US" dirty="0"/>
+              <a:t>팀 이름 변경</a:t>
+            </a:r>
+            <a:endParaRPr lang="en-US" altLang="ko-KR" dirty="0"/>
+          </a:p>
+          <a:p>
+            <a:pPr lvl="1"/>
+            <a:r>
+              <a:rPr lang="ko-KR" altLang="en-US" dirty="0"/>
+              <a:t>팀원 모집</a:t>
+            </a:r>
+            <a:endParaRPr lang="en-US" altLang="ko-KR" dirty="0"/>
+          </a:p>
+          <a:p>
+            <a:pPr lvl="2"/>
+            <a:r>
+              <a:rPr lang="en-US" altLang="ko-KR" dirty="0"/>
+              <a:t>!</a:t>
+            </a:r>
+            <a:r>
+              <a:rPr lang="ko-KR" altLang="en-US" dirty="0"/>
+              <a:t>지원 </a:t>
+            </a:r>
+            <a:r>
+              <a:rPr lang="en-US" altLang="ko-KR" dirty="0"/>
+              <a:t>1</a:t>
+            </a:r>
+            <a:r>
+              <a:rPr lang="ko-KR" altLang="en-US" dirty="0"/>
+              <a:t>팀</a:t>
+            </a:r>
+            <a:endParaRPr lang="en-US" altLang="ko-KR" dirty="0"/>
+          </a:p>
+          <a:p>
+            <a:r>
+              <a:rPr lang="ko-KR" altLang="en-US" dirty="0"/>
+              <a:t>게임 설정</a:t>
+            </a:r>
+            <a:endParaRPr lang="en-US" altLang="ko-KR" dirty="0"/>
+          </a:p>
+        </p:txBody>
+      </p:sp>
+      <p:sp>
+        <p:nvSpPr>
+          <p:cNvPr id="4" name="직사각형 3">
+            <a:extLst>
+              <a:ext uri="{FF2B5EF4-FFF2-40B4-BE49-F238E27FC236}">
+                <a16:creationId xmlns:a16="http://schemas.microsoft.com/office/drawing/2014/main" id="{8DEC2EB6-696F-BA13-2398-E6538710F6F9}"/>
+              </a:ext>
+            </a:extLst>
+          </p:cNvPr>
+          <p:cNvSpPr/>
+          <p:nvPr/>
+        </p:nvSpPr>
+        <p:spPr>
+          <a:xfrm>
+            <a:off x="3289205" y="3429000"/>
+            <a:ext cx="5361413" cy="2966866"/>
+          </a:xfrm>
+          <a:prstGeom prst="rect">
+            <a:avLst/>
+          </a:prstGeom>
+          <a:solidFill>
+            <a:schemeClr val="tx1"/>
+          </a:solidFill>
+        </p:spPr>
+        <p:style>
+          <a:lnRef idx="2">
+            <a:schemeClr val="accent1">
+              <a:shade val="15000"/>
+            </a:schemeClr>
+          </a:lnRef>
+          <a:fillRef idx="1">
+            <a:schemeClr val="accent1"/>
+          </a:fillRef>
+          <a:effectRef idx="0">
+            <a:schemeClr val="accent1"/>
+          </a:effectRef>
+          <a:fontRef idx="minor">
+            <a:schemeClr val="lt1"/>
+          </a:fontRef>
+        </p:style>
+        <p:txBody>
+          <a:bodyPr rtlCol="0" anchor="ctr"/>
+          <a:lstStyle/>
+          <a:p>
+            <a:pPr algn="ctr"/>
+            <a:endParaRPr lang="ko-KR" altLang="en-US"/>
+          </a:p>
+        </p:txBody>
+      </p:sp>
+      <p:sp>
+        <p:nvSpPr>
+          <p:cNvPr id="5" name="TextBox 4">
+            <a:extLst>
+              <a:ext uri="{FF2B5EF4-FFF2-40B4-BE49-F238E27FC236}">
+                <a16:creationId xmlns:a16="http://schemas.microsoft.com/office/drawing/2014/main" id="{066322BE-055A-510C-7336-DE2B817BD79E}"/>
+              </a:ext>
+            </a:extLst>
+          </p:cNvPr>
+          <p:cNvSpPr txBox="1"/>
+          <p:nvPr/>
+        </p:nvSpPr>
+        <p:spPr>
+          <a:xfrm>
+            <a:off x="3411105" y="3494285"/>
+            <a:ext cx="1160895" cy="369332"/>
+          </a:xfrm>
+          <a:prstGeom prst="rect">
+            <a:avLst/>
+          </a:prstGeom>
+          <a:noFill/>
+        </p:spPr>
+        <p:txBody>
+          <a:bodyPr wrap="none" rtlCol="0">
+            <a:spAutoFit/>
+          </a:bodyPr>
+          <a:lstStyle/>
+          <a:p>
+            <a:r>
+              <a:rPr lang="ko-KR" altLang="en-US" dirty="0">
+                <a:solidFill>
+                  <a:schemeClr val="bg1"/>
+                </a:solidFill>
+              </a:rPr>
+              <a:t>게임 이름</a:t>
+            </a:r>
+          </a:p>
+        </p:txBody>
+      </p:sp>
+      <p:sp>
+        <p:nvSpPr>
+          <p:cNvPr id="6" name="직사각형 5">
+            <a:extLst>
+              <a:ext uri="{FF2B5EF4-FFF2-40B4-BE49-F238E27FC236}">
+                <a16:creationId xmlns:a16="http://schemas.microsoft.com/office/drawing/2014/main" id="{BE29348E-554F-DF72-B0AE-9D9C4794C9D5}"/>
+              </a:ext>
+            </a:extLst>
+          </p:cNvPr>
+          <p:cNvSpPr/>
+          <p:nvPr/>
+        </p:nvSpPr>
+        <p:spPr>
+          <a:xfrm>
+            <a:off x="4072040" y="4131246"/>
+            <a:ext cx="3868110" cy="1973525"/>
+          </a:xfrm>
+          <a:prstGeom prst="rect">
+            <a:avLst/>
+          </a:prstGeom>
+        </p:spPr>
+        <p:style>
+          <a:lnRef idx="2">
+            <a:schemeClr val="accent1">
+              <a:shade val="15000"/>
+            </a:schemeClr>
+          </a:lnRef>
+          <a:fillRef idx="1">
+            <a:schemeClr val="accent1"/>
+          </a:fillRef>
+          <a:effectRef idx="0">
+            <a:schemeClr val="accent1"/>
+          </a:effectRef>
+          <a:fontRef idx="minor">
+            <a:schemeClr val="lt1"/>
+          </a:fontRef>
+        </p:style>
+        <p:txBody>
+          <a:bodyPr rtlCol="0" anchor="ctr"/>
+          <a:lstStyle/>
+          <a:p>
+            <a:pPr algn="ctr"/>
+            <a:endParaRPr lang="ko-KR" altLang="en-US"/>
+          </a:p>
+        </p:txBody>
+      </p:sp>
+      <p:sp>
+        <p:nvSpPr>
+          <p:cNvPr id="7" name="직사각형 6">
+            <a:extLst>
+              <a:ext uri="{FF2B5EF4-FFF2-40B4-BE49-F238E27FC236}">
+                <a16:creationId xmlns:a16="http://schemas.microsoft.com/office/drawing/2014/main" id="{3AA43A5D-58B7-0A1D-B61A-C7F964B793E7}"/>
+              </a:ext>
+            </a:extLst>
+          </p:cNvPr>
+          <p:cNvSpPr/>
+          <p:nvPr/>
+        </p:nvSpPr>
+        <p:spPr>
+          <a:xfrm>
+            <a:off x="4075329" y="3863617"/>
+            <a:ext cx="993341" cy="267629"/>
+          </a:xfrm>
+          <a:prstGeom prst="rect">
+            <a:avLst/>
+          </a:prstGeom>
+        </p:spPr>
+        <p:style>
+          <a:lnRef idx="2">
+            <a:schemeClr val="accent1">
+              <a:shade val="15000"/>
+            </a:schemeClr>
+          </a:lnRef>
+          <a:fillRef idx="1">
+            <a:schemeClr val="accent1"/>
+          </a:fillRef>
+          <a:effectRef idx="0">
+            <a:schemeClr val="accent1"/>
+          </a:effectRef>
+          <a:fontRef idx="minor">
+            <a:schemeClr val="lt1"/>
+          </a:fontRef>
+        </p:style>
+        <p:txBody>
+          <a:bodyPr rtlCol="0" anchor="ctr"/>
+          <a:lstStyle/>
+          <a:p>
+            <a:pPr algn="ctr"/>
+            <a:r>
+              <a:rPr lang="en-US" altLang="ko-KR" sz="1400"/>
+              <a:t>1</a:t>
+            </a:r>
+            <a:r>
+              <a:rPr lang="ko-KR" altLang="en-US" sz="1400" dirty="0"/>
+              <a:t>팀</a:t>
+            </a:r>
+          </a:p>
+        </p:txBody>
+      </p:sp>
+      <p:sp>
+        <p:nvSpPr>
+          <p:cNvPr id="8" name="직사각형 7">
+            <a:extLst>
+              <a:ext uri="{FF2B5EF4-FFF2-40B4-BE49-F238E27FC236}">
+                <a16:creationId xmlns:a16="http://schemas.microsoft.com/office/drawing/2014/main" id="{85FC585D-F51A-0291-FAC2-91F844BB8F1D}"/>
+              </a:ext>
+            </a:extLst>
+          </p:cNvPr>
+          <p:cNvSpPr/>
+          <p:nvPr/>
+        </p:nvSpPr>
+        <p:spPr>
+          <a:xfrm>
+            <a:off x="5068670" y="3863617"/>
+            <a:ext cx="940714" cy="267629"/>
+          </a:xfrm>
+          <a:prstGeom prst="rect">
+            <a:avLst/>
+          </a:prstGeom>
+        </p:spPr>
+        <p:style>
+          <a:lnRef idx="2">
+            <a:schemeClr val="accent1">
+              <a:shade val="15000"/>
+            </a:schemeClr>
+          </a:lnRef>
+          <a:fillRef idx="1">
+            <a:schemeClr val="accent1"/>
+          </a:fillRef>
+          <a:effectRef idx="0">
+            <a:schemeClr val="accent1"/>
+          </a:effectRef>
+          <a:fontRef idx="minor">
+            <a:schemeClr val="lt1"/>
+          </a:fontRef>
+        </p:style>
+        <p:txBody>
+          <a:bodyPr rtlCol="0" anchor="ctr"/>
+          <a:lstStyle/>
+          <a:p>
+            <a:pPr algn="ctr"/>
+            <a:r>
+              <a:rPr lang="en-US" altLang="ko-KR" sz="1400" dirty="0"/>
+              <a:t>2</a:t>
+            </a:r>
+            <a:r>
+              <a:rPr lang="ko-KR" altLang="en-US" sz="1400" dirty="0"/>
+              <a:t>팀</a:t>
+            </a:r>
+          </a:p>
+        </p:txBody>
+      </p:sp>
+      <p:sp>
+        <p:nvSpPr>
+          <p:cNvPr id="9" name="직사각형 8">
+            <a:extLst>
+              <a:ext uri="{FF2B5EF4-FFF2-40B4-BE49-F238E27FC236}">
+                <a16:creationId xmlns:a16="http://schemas.microsoft.com/office/drawing/2014/main" id="{0BE5D985-73A3-9C43-87B6-616BD36A0667}"/>
+              </a:ext>
+            </a:extLst>
+          </p:cNvPr>
+          <p:cNvSpPr/>
+          <p:nvPr/>
+        </p:nvSpPr>
+        <p:spPr>
+          <a:xfrm>
+            <a:off x="4295706" y="4298234"/>
+            <a:ext cx="907822" cy="230244"/>
+          </a:xfrm>
+          <a:prstGeom prst="rect">
+            <a:avLst/>
+          </a:prstGeom>
+        </p:spPr>
+        <p:style>
+          <a:lnRef idx="2">
+            <a:schemeClr val="accent1">
+              <a:shade val="15000"/>
+            </a:schemeClr>
+          </a:lnRef>
+          <a:fillRef idx="1">
+            <a:schemeClr val="accent1"/>
+          </a:fillRef>
+          <a:effectRef idx="0">
+            <a:schemeClr val="accent1"/>
+          </a:effectRef>
+          <a:fontRef idx="minor">
+            <a:schemeClr val="lt1"/>
+          </a:fontRef>
+        </p:style>
+        <p:txBody>
+          <a:bodyPr rtlCol="0" anchor="ctr"/>
+          <a:lstStyle/>
+          <a:p>
+            <a:pPr algn="ctr"/>
+            <a:r>
+              <a:rPr lang="ko-KR" altLang="en-US" sz="1100"/>
+              <a:t>팀 이름</a:t>
+            </a:r>
+          </a:p>
+        </p:txBody>
+      </p:sp>
+      <p:sp>
+        <p:nvSpPr>
+          <p:cNvPr id="10" name="직사각형 9">
+            <a:extLst>
+              <a:ext uri="{FF2B5EF4-FFF2-40B4-BE49-F238E27FC236}">
+                <a16:creationId xmlns:a16="http://schemas.microsoft.com/office/drawing/2014/main" id="{1A9959B1-2240-6981-E33A-8D5CC9212F72}"/>
+              </a:ext>
+            </a:extLst>
+          </p:cNvPr>
+          <p:cNvSpPr/>
+          <p:nvPr/>
+        </p:nvSpPr>
+        <p:spPr>
+          <a:xfrm>
+            <a:off x="5617968" y="4283753"/>
+            <a:ext cx="1802486" cy="230244"/>
+          </a:xfrm>
+          <a:prstGeom prst="rect">
+            <a:avLst/>
+          </a:prstGeom>
+        </p:spPr>
+        <p:style>
+          <a:lnRef idx="2">
+            <a:schemeClr val="accent1">
+              <a:shade val="15000"/>
+            </a:schemeClr>
+          </a:lnRef>
+          <a:fillRef idx="1">
+            <a:schemeClr val="accent1"/>
+          </a:fillRef>
+          <a:effectRef idx="0">
+            <a:schemeClr val="accent1"/>
+          </a:effectRef>
+          <a:fontRef idx="minor">
+            <a:schemeClr val="lt1"/>
+          </a:fontRef>
+        </p:style>
+        <p:txBody>
+          <a:bodyPr rtlCol="0" anchor="ctr"/>
+          <a:lstStyle/>
+          <a:p>
+            <a:pPr algn="ctr"/>
+            <a:r>
+              <a:rPr lang="en-US" altLang="ko-KR" sz="1100" dirty="0"/>
+              <a:t>1</a:t>
+            </a:r>
+            <a:r>
+              <a:rPr lang="ko-KR" altLang="en-US" sz="1100" dirty="0"/>
+              <a:t>팀</a:t>
+            </a:r>
+          </a:p>
+        </p:txBody>
+      </p:sp>
+      <p:sp>
+        <p:nvSpPr>
+          <p:cNvPr id="13" name="직사각형 12">
+            <a:extLst>
+              <a:ext uri="{FF2B5EF4-FFF2-40B4-BE49-F238E27FC236}">
+                <a16:creationId xmlns:a16="http://schemas.microsoft.com/office/drawing/2014/main" id="{4B2B3771-B3B9-5A15-BFCD-0D5727908209}"/>
+              </a:ext>
+            </a:extLst>
+          </p:cNvPr>
+          <p:cNvSpPr/>
+          <p:nvPr/>
+        </p:nvSpPr>
+        <p:spPr>
+          <a:xfrm>
+            <a:off x="4295706" y="4617729"/>
+            <a:ext cx="907822" cy="230244"/>
+          </a:xfrm>
+          <a:prstGeom prst="rect">
+            <a:avLst/>
+          </a:prstGeom>
+        </p:spPr>
+        <p:style>
+          <a:lnRef idx="2">
+            <a:schemeClr val="accent1">
+              <a:shade val="15000"/>
+            </a:schemeClr>
+          </a:lnRef>
+          <a:fillRef idx="1">
+            <a:schemeClr val="accent1"/>
+          </a:fillRef>
+          <a:effectRef idx="0">
+            <a:schemeClr val="accent1"/>
+          </a:effectRef>
+          <a:fontRef idx="minor">
+            <a:schemeClr val="lt1"/>
+          </a:fontRef>
+        </p:style>
+        <p:txBody>
+          <a:bodyPr rtlCol="0" anchor="ctr"/>
+          <a:lstStyle/>
+          <a:p>
+            <a:pPr algn="ctr"/>
+            <a:r>
+              <a:rPr lang="ko-KR" altLang="en-US" sz="1100" dirty="0"/>
+              <a:t>팀 구성</a:t>
+            </a:r>
+          </a:p>
+        </p:txBody>
+      </p:sp>
+      <p:sp>
+        <p:nvSpPr>
+          <p:cNvPr id="16" name="직사각형 15">
+            <a:extLst>
+              <a:ext uri="{FF2B5EF4-FFF2-40B4-BE49-F238E27FC236}">
+                <a16:creationId xmlns:a16="http://schemas.microsoft.com/office/drawing/2014/main" id="{2BE90D81-24F1-6864-8045-7DC892623E7C}"/>
+              </a:ext>
+            </a:extLst>
+          </p:cNvPr>
+          <p:cNvSpPr/>
+          <p:nvPr/>
+        </p:nvSpPr>
+        <p:spPr>
+          <a:xfrm>
+            <a:off x="4295706" y="4941114"/>
+            <a:ext cx="907822" cy="230244"/>
+          </a:xfrm>
+          <a:prstGeom prst="rect">
+            <a:avLst/>
+          </a:prstGeom>
+        </p:spPr>
+        <p:style>
+          <a:lnRef idx="2">
+            <a:schemeClr val="accent1">
+              <a:shade val="15000"/>
+            </a:schemeClr>
+          </a:lnRef>
+          <a:fillRef idx="1">
+            <a:schemeClr val="accent1"/>
+          </a:fillRef>
+          <a:effectRef idx="0">
+            <a:schemeClr val="accent1"/>
+          </a:effectRef>
+          <a:fontRef idx="minor">
+            <a:schemeClr val="lt1"/>
+          </a:fontRef>
+        </p:style>
+        <p:txBody>
+          <a:bodyPr rtlCol="0" anchor="ctr"/>
+          <a:lstStyle/>
+          <a:p>
+            <a:pPr algn="ctr"/>
+            <a:r>
+              <a:rPr lang="ko-KR" altLang="en-US" sz="1100" dirty="0"/>
+              <a:t>제한시간</a:t>
+            </a:r>
+          </a:p>
+        </p:txBody>
+      </p:sp>
+      <p:sp>
+        <p:nvSpPr>
+          <p:cNvPr id="17" name="직사각형 16">
+            <a:extLst>
+              <a:ext uri="{FF2B5EF4-FFF2-40B4-BE49-F238E27FC236}">
+                <a16:creationId xmlns:a16="http://schemas.microsoft.com/office/drawing/2014/main" id="{D60C8E7A-6CAF-C360-6A46-C440CCAADDD4}"/>
+              </a:ext>
+            </a:extLst>
+          </p:cNvPr>
+          <p:cNvSpPr/>
+          <p:nvPr/>
+        </p:nvSpPr>
+        <p:spPr>
+          <a:xfrm>
+            <a:off x="5617968" y="4926633"/>
+            <a:ext cx="1802486" cy="230244"/>
+          </a:xfrm>
+          <a:prstGeom prst="rect">
+            <a:avLst/>
+          </a:prstGeom>
+        </p:spPr>
+        <p:style>
+          <a:lnRef idx="2">
+            <a:schemeClr val="accent1">
+              <a:shade val="15000"/>
+            </a:schemeClr>
+          </a:lnRef>
+          <a:fillRef idx="1">
+            <a:schemeClr val="accent1"/>
+          </a:fillRef>
+          <a:effectRef idx="0">
+            <a:schemeClr val="accent1"/>
+          </a:effectRef>
+          <a:fontRef idx="minor">
+            <a:schemeClr val="lt1"/>
+          </a:fontRef>
+        </p:style>
+        <p:txBody>
+          <a:bodyPr rtlCol="0" anchor="ctr"/>
+          <a:lstStyle/>
+          <a:p>
+            <a:pPr algn="ctr"/>
+            <a:r>
+              <a:rPr lang="ko-KR" altLang="en-US" sz="1100" dirty="0"/>
+              <a:t>무제한</a:t>
+            </a:r>
+          </a:p>
+        </p:txBody>
+      </p:sp>
+      <p:sp>
+        <p:nvSpPr>
+          <p:cNvPr id="19" name="직사각형 18">
+            <a:extLst>
+              <a:ext uri="{FF2B5EF4-FFF2-40B4-BE49-F238E27FC236}">
+                <a16:creationId xmlns:a16="http://schemas.microsoft.com/office/drawing/2014/main" id="{5674A6D1-8A6D-D1CF-7597-637DF4EB4D8F}"/>
+              </a:ext>
+            </a:extLst>
+          </p:cNvPr>
+          <p:cNvSpPr/>
+          <p:nvPr/>
+        </p:nvSpPr>
+        <p:spPr>
+          <a:xfrm>
+            <a:off x="4295706" y="5278980"/>
+            <a:ext cx="907822" cy="230244"/>
+          </a:xfrm>
+          <a:prstGeom prst="rect">
+            <a:avLst/>
+          </a:prstGeom>
+        </p:spPr>
+        <p:style>
+          <a:lnRef idx="2">
+            <a:schemeClr val="accent1">
+              <a:shade val="15000"/>
+            </a:schemeClr>
+          </a:lnRef>
+          <a:fillRef idx="1">
+            <a:schemeClr val="accent1"/>
+          </a:fillRef>
+          <a:effectRef idx="0">
+            <a:schemeClr val="accent1"/>
+          </a:effectRef>
+          <a:fontRef idx="minor">
+            <a:schemeClr val="lt1"/>
+          </a:fontRef>
+        </p:style>
+        <p:txBody>
+          <a:bodyPr rtlCol="0" anchor="ctr"/>
+          <a:lstStyle/>
+          <a:p>
+            <a:pPr algn="ctr"/>
+            <a:r>
+              <a:rPr lang="ko-KR" altLang="en-US" sz="1100" dirty="0"/>
+              <a:t>착수방식</a:t>
+            </a:r>
+          </a:p>
+        </p:txBody>
+      </p:sp>
+      <p:sp>
+        <p:nvSpPr>
+          <p:cNvPr id="20" name="직사각형 19">
+            <a:extLst>
+              <a:ext uri="{FF2B5EF4-FFF2-40B4-BE49-F238E27FC236}">
+                <a16:creationId xmlns:a16="http://schemas.microsoft.com/office/drawing/2014/main" id="{F9ED76F5-9305-4F5D-9B0F-CEE2D02423E6}"/>
+              </a:ext>
+            </a:extLst>
+          </p:cNvPr>
+          <p:cNvSpPr/>
+          <p:nvPr/>
+        </p:nvSpPr>
+        <p:spPr>
+          <a:xfrm>
+            <a:off x="5617968" y="5264499"/>
+            <a:ext cx="1802486" cy="230244"/>
+          </a:xfrm>
+          <a:prstGeom prst="rect">
+            <a:avLst/>
+          </a:prstGeom>
+        </p:spPr>
+        <p:style>
+          <a:lnRef idx="2">
+            <a:schemeClr val="accent1">
+              <a:shade val="15000"/>
+            </a:schemeClr>
+          </a:lnRef>
+          <a:fillRef idx="1">
+            <a:schemeClr val="accent1"/>
+          </a:fillRef>
+          <a:effectRef idx="0">
+            <a:schemeClr val="accent1"/>
+          </a:effectRef>
+          <a:fontRef idx="minor">
+            <a:schemeClr val="lt1"/>
+          </a:fontRef>
+        </p:style>
+        <p:txBody>
+          <a:bodyPr rtlCol="0" anchor="ctr"/>
+          <a:lstStyle/>
+          <a:p>
+            <a:pPr algn="ctr"/>
+            <a:r>
+              <a:rPr lang="ko-KR" altLang="en-US" sz="1100" dirty="0"/>
+              <a:t>클릭</a:t>
+            </a:r>
+          </a:p>
+        </p:txBody>
+      </p:sp>
+      <p:sp>
+        <p:nvSpPr>
+          <p:cNvPr id="22" name="직사각형 21">
+            <a:extLst>
+              <a:ext uri="{FF2B5EF4-FFF2-40B4-BE49-F238E27FC236}">
+                <a16:creationId xmlns:a16="http://schemas.microsoft.com/office/drawing/2014/main" id="{ECED6BAE-141C-9754-6D6F-3519D834CF4A}"/>
+              </a:ext>
+            </a:extLst>
+          </p:cNvPr>
+          <p:cNvSpPr/>
+          <p:nvPr/>
+        </p:nvSpPr>
+        <p:spPr>
+          <a:xfrm>
+            <a:off x="6729721" y="3863617"/>
+            <a:ext cx="1210429" cy="267629"/>
+          </a:xfrm>
+          <a:prstGeom prst="rect">
+            <a:avLst/>
+          </a:prstGeom>
+        </p:spPr>
+        <p:style>
+          <a:lnRef idx="2">
+            <a:schemeClr val="accent1">
+              <a:shade val="15000"/>
+            </a:schemeClr>
+          </a:lnRef>
+          <a:fillRef idx="1">
+            <a:schemeClr val="accent1"/>
+          </a:fillRef>
+          <a:effectRef idx="0">
+            <a:schemeClr val="accent1"/>
+          </a:effectRef>
+          <a:fontRef idx="minor">
+            <a:schemeClr val="lt1"/>
+          </a:fontRef>
+        </p:style>
+        <p:txBody>
+          <a:bodyPr rtlCol="0" anchor="ctr"/>
+          <a:lstStyle/>
+          <a:p>
+            <a:pPr algn="ctr"/>
+            <a:r>
+              <a:rPr lang="ko-KR" altLang="en-US" sz="1400" dirty="0"/>
+              <a:t>게임 설정</a:t>
+            </a:r>
+          </a:p>
+        </p:txBody>
+      </p:sp>
+      <p:sp>
+        <p:nvSpPr>
+          <p:cNvPr id="27" name="이등변 삼각형 26">
+            <a:extLst>
+              <a:ext uri="{FF2B5EF4-FFF2-40B4-BE49-F238E27FC236}">
+                <a16:creationId xmlns:a16="http://schemas.microsoft.com/office/drawing/2014/main" id="{682AD31A-5AEE-2736-20A2-29DDDAA2B64A}"/>
+              </a:ext>
+            </a:extLst>
+          </p:cNvPr>
+          <p:cNvSpPr/>
+          <p:nvPr/>
+        </p:nvSpPr>
+        <p:spPr>
+          <a:xfrm rot="5400000">
+            <a:off x="7498344" y="4301787"/>
+            <a:ext cx="225244" cy="194176"/>
+          </a:xfrm>
+          <a:prstGeom prst="triangle">
+            <a:avLst/>
+          </a:prstGeom>
+        </p:spPr>
+        <p:style>
+          <a:lnRef idx="2">
+            <a:schemeClr val="accent1">
+              <a:shade val="15000"/>
+            </a:schemeClr>
+          </a:lnRef>
+          <a:fillRef idx="1">
+            <a:schemeClr val="accent1"/>
+          </a:fillRef>
+          <a:effectRef idx="0">
+            <a:schemeClr val="accent1"/>
+          </a:effectRef>
+          <a:fontRef idx="minor">
+            <a:schemeClr val="lt1"/>
+          </a:fontRef>
+        </p:style>
+        <p:txBody>
+          <a:bodyPr rtlCol="0" anchor="ctr"/>
+          <a:lstStyle/>
+          <a:p>
+            <a:pPr algn="ctr"/>
+            <a:endParaRPr lang="ko-KR" altLang="en-US"/>
+          </a:p>
+        </p:txBody>
+      </p:sp>
+      <p:sp>
+        <p:nvSpPr>
+          <p:cNvPr id="28" name="직사각형 27">
+            <a:extLst>
+              <a:ext uri="{FF2B5EF4-FFF2-40B4-BE49-F238E27FC236}">
+                <a16:creationId xmlns:a16="http://schemas.microsoft.com/office/drawing/2014/main" id="{E00FD92D-6743-C9CB-CAE0-7953EC7FFC84}"/>
+              </a:ext>
+            </a:extLst>
+          </p:cNvPr>
+          <p:cNvSpPr/>
+          <p:nvPr/>
+        </p:nvSpPr>
+        <p:spPr>
+          <a:xfrm>
+            <a:off x="5617968" y="4603248"/>
+            <a:ext cx="1802486" cy="230244"/>
+          </a:xfrm>
+          <a:prstGeom prst="rect">
+            <a:avLst/>
+          </a:prstGeom>
+        </p:spPr>
+        <p:style>
+          <a:lnRef idx="2">
+            <a:schemeClr val="accent1">
+              <a:shade val="15000"/>
+            </a:schemeClr>
+          </a:lnRef>
+          <a:fillRef idx="1">
+            <a:schemeClr val="accent1"/>
+          </a:fillRef>
+          <a:effectRef idx="0">
+            <a:schemeClr val="accent1"/>
+          </a:effectRef>
+          <a:fontRef idx="minor">
+            <a:schemeClr val="lt1"/>
+          </a:fontRef>
+        </p:style>
+        <p:txBody>
+          <a:bodyPr rtlCol="0" anchor="ctr"/>
+          <a:lstStyle/>
+          <a:p>
+            <a:pPr algn="ctr"/>
+            <a:r>
+              <a:rPr lang="ko-KR" altLang="en-US" sz="1100" dirty="0" err="1"/>
+              <a:t>스트리머</a:t>
+            </a:r>
+            <a:endParaRPr lang="ko-KR" altLang="en-US" sz="1100" dirty="0"/>
+          </a:p>
+        </p:txBody>
+      </p:sp>
+      <p:sp>
+        <p:nvSpPr>
+          <p:cNvPr id="29" name="이등변 삼각형 28">
+            <a:extLst>
+              <a:ext uri="{FF2B5EF4-FFF2-40B4-BE49-F238E27FC236}">
+                <a16:creationId xmlns:a16="http://schemas.microsoft.com/office/drawing/2014/main" id="{00794B87-EE3B-0069-AB06-400ACD6206D0}"/>
+              </a:ext>
+            </a:extLst>
+          </p:cNvPr>
+          <p:cNvSpPr/>
+          <p:nvPr/>
+        </p:nvSpPr>
+        <p:spPr>
+          <a:xfrm rot="5400000">
+            <a:off x="7498345" y="4625023"/>
+            <a:ext cx="225244" cy="194176"/>
+          </a:xfrm>
+          <a:prstGeom prst="triangle">
+            <a:avLst/>
+          </a:prstGeom>
+        </p:spPr>
+        <p:style>
+          <a:lnRef idx="2">
+            <a:schemeClr val="accent1">
+              <a:shade val="15000"/>
+            </a:schemeClr>
+          </a:lnRef>
+          <a:fillRef idx="1">
+            <a:schemeClr val="accent1"/>
+          </a:fillRef>
+          <a:effectRef idx="0">
+            <a:schemeClr val="accent1"/>
+          </a:effectRef>
+          <a:fontRef idx="minor">
+            <a:schemeClr val="lt1"/>
+          </a:fontRef>
+        </p:style>
+        <p:txBody>
+          <a:bodyPr rtlCol="0" anchor="ctr"/>
+          <a:lstStyle/>
+          <a:p>
+            <a:pPr algn="ctr"/>
+            <a:endParaRPr lang="ko-KR" altLang="en-US"/>
+          </a:p>
+        </p:txBody>
+      </p:sp>
+      <p:sp>
+        <p:nvSpPr>
+          <p:cNvPr id="30" name="이등변 삼각형 29">
+            <a:extLst>
+              <a:ext uri="{FF2B5EF4-FFF2-40B4-BE49-F238E27FC236}">
+                <a16:creationId xmlns:a16="http://schemas.microsoft.com/office/drawing/2014/main" id="{6CE7D561-B749-626C-ED4D-516565A3EE70}"/>
+              </a:ext>
+            </a:extLst>
+          </p:cNvPr>
+          <p:cNvSpPr/>
+          <p:nvPr/>
+        </p:nvSpPr>
+        <p:spPr>
+          <a:xfrm rot="5400000">
+            <a:off x="7518079" y="4936806"/>
+            <a:ext cx="225244" cy="194176"/>
+          </a:xfrm>
+          <a:prstGeom prst="triangle">
+            <a:avLst/>
+          </a:prstGeom>
+        </p:spPr>
+        <p:style>
+          <a:lnRef idx="2">
+            <a:schemeClr val="accent1">
+              <a:shade val="15000"/>
+            </a:schemeClr>
+          </a:lnRef>
+          <a:fillRef idx="1">
+            <a:schemeClr val="accent1"/>
+          </a:fillRef>
+          <a:effectRef idx="0">
+            <a:schemeClr val="accent1"/>
+          </a:effectRef>
+          <a:fontRef idx="minor">
+            <a:schemeClr val="lt1"/>
+          </a:fontRef>
+        </p:style>
+        <p:txBody>
+          <a:bodyPr rtlCol="0" anchor="ctr"/>
+          <a:lstStyle/>
+          <a:p>
+            <a:pPr algn="ctr"/>
+            <a:endParaRPr lang="ko-KR" altLang="en-US"/>
+          </a:p>
+        </p:txBody>
+      </p:sp>
+      <p:sp>
+        <p:nvSpPr>
+          <p:cNvPr id="31" name="이등변 삼각형 30">
+            <a:extLst>
+              <a:ext uri="{FF2B5EF4-FFF2-40B4-BE49-F238E27FC236}">
+                <a16:creationId xmlns:a16="http://schemas.microsoft.com/office/drawing/2014/main" id="{34482D0A-E7C3-656B-704D-B40EF8721EEA}"/>
+              </a:ext>
+            </a:extLst>
+          </p:cNvPr>
+          <p:cNvSpPr/>
+          <p:nvPr/>
+        </p:nvSpPr>
+        <p:spPr>
+          <a:xfrm rot="5400000">
+            <a:off x="7511500" y="5248589"/>
+            <a:ext cx="225244" cy="194176"/>
+          </a:xfrm>
+          <a:prstGeom prst="triangle">
+            <a:avLst/>
+          </a:prstGeom>
+        </p:spPr>
+        <p:style>
+          <a:lnRef idx="2">
+            <a:schemeClr val="accent1">
+              <a:shade val="15000"/>
+            </a:schemeClr>
+          </a:lnRef>
+          <a:fillRef idx="1">
+            <a:schemeClr val="accent1"/>
+          </a:fillRef>
+          <a:effectRef idx="0">
+            <a:schemeClr val="accent1"/>
+          </a:effectRef>
+          <a:fontRef idx="minor">
+            <a:schemeClr val="lt1"/>
+          </a:fontRef>
+        </p:style>
+        <p:txBody>
+          <a:bodyPr rtlCol="0" anchor="ctr"/>
+          <a:lstStyle/>
+          <a:p>
+            <a:pPr algn="ctr"/>
+            <a:endParaRPr lang="ko-KR" altLang="en-US"/>
+          </a:p>
+        </p:txBody>
+      </p:sp>
+      <p:sp>
+        <p:nvSpPr>
+          <p:cNvPr id="32" name="이등변 삼각형 31">
+            <a:extLst>
+              <a:ext uri="{FF2B5EF4-FFF2-40B4-BE49-F238E27FC236}">
+                <a16:creationId xmlns:a16="http://schemas.microsoft.com/office/drawing/2014/main" id="{E0D1F202-8D74-5478-F08F-7BE444B8C6C9}"/>
+              </a:ext>
+            </a:extLst>
+          </p:cNvPr>
+          <p:cNvSpPr/>
+          <p:nvPr/>
+        </p:nvSpPr>
+        <p:spPr>
+          <a:xfrm rot="16200000">
+            <a:off x="5301678" y="4313768"/>
+            <a:ext cx="225244" cy="194176"/>
+          </a:xfrm>
+          <a:prstGeom prst="triangle">
+            <a:avLst/>
+          </a:prstGeom>
+        </p:spPr>
+        <p:style>
+          <a:lnRef idx="2">
+            <a:schemeClr val="accent1">
+              <a:shade val="15000"/>
+            </a:schemeClr>
+          </a:lnRef>
+          <a:fillRef idx="1">
+            <a:schemeClr val="accent1"/>
+          </a:fillRef>
+          <a:effectRef idx="0">
+            <a:schemeClr val="accent1"/>
+          </a:effectRef>
+          <a:fontRef idx="minor">
+            <a:schemeClr val="lt1"/>
+          </a:fontRef>
+        </p:style>
+        <p:txBody>
+          <a:bodyPr rtlCol="0" anchor="ctr"/>
+          <a:lstStyle/>
+          <a:p>
+            <a:pPr algn="ctr"/>
+            <a:endParaRPr lang="ko-KR" altLang="en-US"/>
+          </a:p>
+        </p:txBody>
+      </p:sp>
+      <p:sp>
+        <p:nvSpPr>
+          <p:cNvPr id="33" name="이등변 삼각형 32">
+            <a:extLst>
+              <a:ext uri="{FF2B5EF4-FFF2-40B4-BE49-F238E27FC236}">
+                <a16:creationId xmlns:a16="http://schemas.microsoft.com/office/drawing/2014/main" id="{D85897D6-E419-507D-C585-43D74AFBE635}"/>
+              </a:ext>
+            </a:extLst>
+          </p:cNvPr>
+          <p:cNvSpPr/>
+          <p:nvPr/>
+        </p:nvSpPr>
+        <p:spPr>
+          <a:xfrm rot="16200000">
+            <a:off x="5301679" y="4637004"/>
+            <a:ext cx="225244" cy="194176"/>
+          </a:xfrm>
+          <a:prstGeom prst="triangle">
+            <a:avLst/>
+          </a:prstGeom>
+        </p:spPr>
+        <p:style>
+          <a:lnRef idx="2">
+            <a:schemeClr val="accent1">
+              <a:shade val="15000"/>
+            </a:schemeClr>
+          </a:lnRef>
+          <a:fillRef idx="1">
+            <a:schemeClr val="accent1"/>
+          </a:fillRef>
+          <a:effectRef idx="0">
+            <a:schemeClr val="accent1"/>
+          </a:effectRef>
+          <a:fontRef idx="minor">
+            <a:schemeClr val="lt1"/>
+          </a:fontRef>
+        </p:style>
+        <p:txBody>
+          <a:bodyPr rtlCol="0" anchor="ctr"/>
+          <a:lstStyle/>
+          <a:p>
+            <a:pPr algn="ctr"/>
+            <a:endParaRPr lang="ko-KR" altLang="en-US"/>
+          </a:p>
+        </p:txBody>
+      </p:sp>
+      <p:sp>
+        <p:nvSpPr>
+          <p:cNvPr id="34" name="이등변 삼각형 33">
+            <a:extLst>
+              <a:ext uri="{FF2B5EF4-FFF2-40B4-BE49-F238E27FC236}">
+                <a16:creationId xmlns:a16="http://schemas.microsoft.com/office/drawing/2014/main" id="{D3FF46F8-8428-93AE-2521-7FD7D58860E5}"/>
+              </a:ext>
+            </a:extLst>
+          </p:cNvPr>
+          <p:cNvSpPr/>
+          <p:nvPr/>
+        </p:nvSpPr>
+        <p:spPr>
+          <a:xfrm rot="16200000">
+            <a:off x="5321413" y="4948787"/>
+            <a:ext cx="225244" cy="194176"/>
+          </a:xfrm>
+          <a:prstGeom prst="triangle">
+            <a:avLst/>
+          </a:prstGeom>
+        </p:spPr>
+        <p:style>
+          <a:lnRef idx="2">
+            <a:schemeClr val="accent1">
+              <a:shade val="15000"/>
+            </a:schemeClr>
+          </a:lnRef>
+          <a:fillRef idx="1">
+            <a:schemeClr val="accent1"/>
+          </a:fillRef>
+          <a:effectRef idx="0">
+            <a:schemeClr val="accent1"/>
+          </a:effectRef>
+          <a:fontRef idx="minor">
+            <a:schemeClr val="lt1"/>
+          </a:fontRef>
+        </p:style>
+        <p:txBody>
+          <a:bodyPr rtlCol="0" anchor="ctr"/>
+          <a:lstStyle/>
+          <a:p>
+            <a:pPr algn="ctr"/>
+            <a:endParaRPr lang="ko-KR" altLang="en-US"/>
+          </a:p>
+        </p:txBody>
+      </p:sp>
+      <p:sp>
+        <p:nvSpPr>
+          <p:cNvPr id="35" name="이등변 삼각형 34">
+            <a:extLst>
+              <a:ext uri="{FF2B5EF4-FFF2-40B4-BE49-F238E27FC236}">
+                <a16:creationId xmlns:a16="http://schemas.microsoft.com/office/drawing/2014/main" id="{A6830986-BFE9-E8B7-04B4-DB6B51706A3B}"/>
+              </a:ext>
+            </a:extLst>
+          </p:cNvPr>
+          <p:cNvSpPr/>
+          <p:nvPr/>
+        </p:nvSpPr>
+        <p:spPr>
+          <a:xfrm rot="16200000">
+            <a:off x="5314834" y="5260570"/>
+            <a:ext cx="225244" cy="194176"/>
+          </a:xfrm>
+          <a:prstGeom prst="triangle">
+            <a:avLst/>
+          </a:prstGeom>
+        </p:spPr>
+        <p:style>
+          <a:lnRef idx="2">
+            <a:schemeClr val="accent1">
+              <a:shade val="15000"/>
+            </a:schemeClr>
+          </a:lnRef>
+          <a:fillRef idx="1">
+            <a:schemeClr val="accent1"/>
+          </a:fillRef>
+          <a:effectRef idx="0">
+            <a:schemeClr val="accent1"/>
+          </a:effectRef>
+          <a:fontRef idx="minor">
+            <a:schemeClr val="lt1"/>
+          </a:fontRef>
+        </p:style>
+        <p:txBody>
+          <a:bodyPr rtlCol="0" anchor="ctr"/>
+          <a:lstStyle/>
+          <a:p>
+            <a:pPr algn="ctr"/>
+            <a:endParaRPr lang="ko-KR" altLang="en-US"/>
           </a:p>
         </p:txBody>
       </p:sp>
     </p:spTree>
     <p:extLst>
       <p:ext uri="{BB962C8B-B14F-4D97-AF65-F5344CB8AC3E}">
-        <p14:creationId xmlns:p14="http://schemas.microsoft.com/office/powerpoint/2010/main" val="1345569251"/>
+        <p14:creationId xmlns:p14="http://schemas.microsoft.com/office/powerpoint/2010/main" val="1482160326"/>
       </p:ext>
     </p:extLst>
   </p:cSld>
@@ -5782,7 +7228,7 @@
           <p:cNvPr id="2" name="제목 1">
             <a:extLst>
               <a:ext uri="{FF2B5EF4-FFF2-40B4-BE49-F238E27FC236}">
-                <a16:creationId xmlns:a16="http://schemas.microsoft.com/office/drawing/2014/main" id="{5F475798-6BD1-DB72-2691-364F228F7336}"/>
+                <a16:creationId xmlns:a16="http://schemas.microsoft.com/office/drawing/2014/main" id="{9E877CFA-D76B-85C0-B45A-2D3E4376C247}"/>
               </a:ext>
             </a:extLst>
           </p:cNvPr>
@@ -5800,7 +7246,7 @@
           <a:p>
             <a:r>
               <a:rPr lang="ko-KR" altLang="en-US" dirty="0"/>
-              <a:t>설정 씬</a:t>
+              <a:t>게임 씬</a:t>
             </a:r>
           </a:p>
         </p:txBody>
@@ -5810,7 +7256,7 @@
           <p:cNvPr id="3" name="내용 개체 틀 2">
             <a:extLst>
               <a:ext uri="{FF2B5EF4-FFF2-40B4-BE49-F238E27FC236}">
-                <a16:creationId xmlns:a16="http://schemas.microsoft.com/office/drawing/2014/main" id="{4EEDD557-B07D-8FE3-8230-CF863CE2D332}"/>
+                <a16:creationId xmlns:a16="http://schemas.microsoft.com/office/drawing/2014/main" id="{2B2062B5-09F3-BBB4-5961-D9E5FAA9B8AB}"/>
               </a:ext>
             </a:extLst>
           </p:cNvPr>
@@ -5826,109 +7272,14 @@
           <a:bodyPr/>
           <a:lstStyle/>
           <a:p>
-            <a:r>
-              <a:rPr lang="ko-KR" altLang="en-US" dirty="0"/>
-              <a:t>팀 설정</a:t>
-            </a:r>
-            <a:endParaRPr lang="en-US" altLang="ko-KR" dirty="0"/>
-          </a:p>
-          <a:p>
-            <a:pPr lvl="1"/>
-            <a:r>
-              <a:rPr lang="ko-KR" altLang="en-US" dirty="0"/>
-              <a:t>팀 종류</a:t>
-            </a:r>
-            <a:endParaRPr lang="en-US" altLang="ko-KR" dirty="0"/>
-          </a:p>
-          <a:p>
-            <a:pPr lvl="2"/>
-            <a:r>
-              <a:rPr lang="ko-KR" altLang="en-US" dirty="0" err="1"/>
-              <a:t>스트리머</a:t>
-            </a:r>
-            <a:r>
-              <a:rPr lang="en-US" altLang="ko-KR" dirty="0"/>
-              <a:t>, </a:t>
-            </a:r>
-            <a:r>
-              <a:rPr lang="ko-KR" altLang="en-US" dirty="0"/>
-              <a:t>시청자</a:t>
-            </a:r>
-            <a:r>
-              <a:rPr lang="en-US" altLang="ko-KR" dirty="0"/>
-              <a:t>, </a:t>
-            </a:r>
-            <a:r>
-              <a:rPr lang="ko-KR" altLang="en-US" dirty="0" err="1"/>
-              <a:t>스트리머</a:t>
-            </a:r>
-            <a:r>
-              <a:rPr lang="en-US" altLang="ko-KR" dirty="0"/>
-              <a:t>+</a:t>
-            </a:r>
-            <a:r>
-              <a:rPr lang="ko-KR" altLang="en-US" dirty="0"/>
-              <a:t>일부 시청자</a:t>
-            </a:r>
-            <a:r>
-              <a:rPr lang="en-US" altLang="ko-KR" dirty="0"/>
-              <a:t>, </a:t>
-            </a:r>
-            <a:r>
-              <a:rPr lang="ko-KR" altLang="en-US" dirty="0"/>
-              <a:t>일부 시청자</a:t>
-            </a:r>
-            <a:endParaRPr lang="en-US" altLang="ko-KR" dirty="0"/>
-          </a:p>
-          <a:p>
-            <a:pPr lvl="1"/>
-            <a:r>
-              <a:rPr lang="ko-KR" altLang="en-US" dirty="0"/>
-              <a:t>팀 이름 변경</a:t>
-            </a:r>
-            <a:endParaRPr lang="en-US" altLang="ko-KR" dirty="0"/>
-          </a:p>
-          <a:p>
-            <a:pPr lvl="1"/>
-            <a:r>
-              <a:rPr lang="ko-KR" altLang="en-US" dirty="0"/>
-              <a:t>팀원 모집</a:t>
-            </a:r>
-            <a:endParaRPr lang="en-US" altLang="ko-KR" dirty="0"/>
-          </a:p>
-          <a:p>
-            <a:pPr lvl="2"/>
-            <a:r>
-              <a:rPr lang="en-US" altLang="ko-KR" dirty="0"/>
-              <a:t>!</a:t>
-            </a:r>
-            <a:r>
-              <a:rPr lang="ko-KR" altLang="en-US" dirty="0"/>
-              <a:t>지원 </a:t>
-            </a:r>
-            <a:r>
-              <a:rPr lang="en-US" altLang="ko-KR" dirty="0"/>
-              <a:t>1</a:t>
-            </a:r>
-            <a:r>
-              <a:rPr lang="ko-KR" altLang="en-US" dirty="0"/>
-              <a:t>팀</a:t>
-            </a:r>
-            <a:endParaRPr lang="en-US" altLang="ko-KR" dirty="0"/>
-          </a:p>
-          <a:p>
-            <a:r>
-              <a:rPr lang="ko-KR" altLang="en-US" dirty="0"/>
-              <a:t>게임</a:t>
-            </a:r>
-            <a:endParaRPr lang="en-US" altLang="ko-KR" dirty="0"/>
+            <a:endParaRPr lang="ko-KR" altLang="en-US"/>
           </a:p>
         </p:txBody>
       </p:sp>
     </p:spTree>
     <p:extLst>
       <p:ext uri="{BB962C8B-B14F-4D97-AF65-F5344CB8AC3E}">
-        <p14:creationId xmlns:p14="http://schemas.microsoft.com/office/powerpoint/2010/main" val="1466181909"/>
+        <p14:creationId xmlns:p14="http://schemas.microsoft.com/office/powerpoint/2010/main" val="1574060074"/>
       </p:ext>
     </p:extLst>
   </p:cSld>
@@ -5960,7 +7311,7 @@
           <p:cNvPr id="2" name="제목 1">
             <a:extLst>
               <a:ext uri="{FF2B5EF4-FFF2-40B4-BE49-F238E27FC236}">
-                <a16:creationId xmlns:a16="http://schemas.microsoft.com/office/drawing/2014/main" id="{9E877CFA-D76B-85C0-B45A-2D3E4376C247}"/>
+                <a16:creationId xmlns:a16="http://schemas.microsoft.com/office/drawing/2014/main" id="{D360511F-5B9A-BF62-5020-CA9D29CE4C82}"/>
               </a:ext>
             </a:extLst>
           </p:cNvPr>
@@ -5978,7 +7329,7 @@
           <a:p>
             <a:r>
               <a:rPr lang="ko-KR" altLang="en-US" dirty="0"/>
-              <a:t>게임 씬</a:t>
+              <a:t>결과 씬</a:t>
             </a:r>
           </a:p>
         </p:txBody>
@@ -5988,7 +7339,7 @@
           <p:cNvPr id="3" name="내용 개체 틀 2">
             <a:extLst>
               <a:ext uri="{FF2B5EF4-FFF2-40B4-BE49-F238E27FC236}">
-                <a16:creationId xmlns:a16="http://schemas.microsoft.com/office/drawing/2014/main" id="{2B2062B5-09F3-BBB4-5961-D9E5FAA9B8AB}"/>
+                <a16:creationId xmlns:a16="http://schemas.microsoft.com/office/drawing/2014/main" id="{E4C961DA-C9DB-98B8-167A-65C4E9D77990}"/>
               </a:ext>
             </a:extLst>
           </p:cNvPr>
@@ -6011,7 +7362,7 @@
     </p:spTree>
     <p:extLst>
       <p:ext uri="{BB962C8B-B14F-4D97-AF65-F5344CB8AC3E}">
-        <p14:creationId xmlns:p14="http://schemas.microsoft.com/office/powerpoint/2010/main" val="1574060074"/>
+        <p14:creationId xmlns:p14="http://schemas.microsoft.com/office/powerpoint/2010/main" val="1128000774"/>
       </p:ext>
     </p:extLst>
   </p:cSld>

</xml_diff>